<commit_message>
UPDATED PP. USE THIS
</commit_message>
<xml_diff>
--- a/Foodies Delight - Project 1.pptx
+++ b/Foodies Delight - Project 1.pptx
@@ -123,7 +123,7 @@
 <file path=ppt/revisionInfo.xml><?xml version="1.0" encoding="utf-8"?>
 <p1510:revInfo xmlns:a="http://schemas.openxmlformats.org/drawingml/2006/main" xmlns:r="http://schemas.openxmlformats.org/officeDocument/2006/relationships" xmlns:p1510="http://schemas.microsoft.com/office/powerpoint/2015/10/main">
   <p1510:revLst>
-    <p1510:client id="{E63637B8-3230-49FC-8A10-2F32309B36E9}" v="264" dt="2025-01-28T03:33:19.370"/>
+    <p1510:client id="{E63637B8-3230-49FC-8A10-2F32309B36E9}" v="1075" dt="2025-01-29T00:44:48.345"/>
   </p1510:revLst>
 </p1510:revInfo>
 </file>
@@ -133,18 +133,63 @@
   <pc:docChgLst>
     <pc:chgData name="Kimta Nguyen" userId="593776cdb65095db" providerId="LiveId" clId="{E63637B8-3230-49FC-8A10-2F32309B36E9}"/>
     <pc:docChg chg="undo custSel modSld">
-      <pc:chgData name="Kimta Nguyen" userId="593776cdb65095db" providerId="LiveId" clId="{E63637B8-3230-49FC-8A10-2F32309B36E9}" dt="2025-01-28T03:33:19.367" v="447" actId="20577"/>
+      <pc:chgData name="Kimta Nguyen" userId="593776cdb65095db" providerId="LiveId" clId="{E63637B8-3230-49FC-8A10-2F32309B36E9}" dt="2025-01-29T00:44:48.344" v="1258" actId="20577"/>
       <pc:docMkLst>
         <pc:docMk/>
       </pc:docMkLst>
       <pc:sldChg chg="modSp">
-        <pc:chgData name="Kimta Nguyen" userId="593776cdb65095db" providerId="LiveId" clId="{E63637B8-3230-49FC-8A10-2F32309B36E9}" dt="2025-01-28T03:32:17.983" v="435"/>
+        <pc:chgData name="Kimta Nguyen" userId="593776cdb65095db" providerId="LiveId" clId="{E63637B8-3230-49FC-8A10-2F32309B36E9}" dt="2025-01-29T00:32:09.282" v="474" actId="20577"/>
+        <pc:sldMkLst>
+          <pc:docMk/>
+          <pc:sldMk cId="620445983" sldId="257"/>
+        </pc:sldMkLst>
+        <pc:graphicFrameChg chg="mod">
+          <ac:chgData name="Kimta Nguyen" userId="593776cdb65095db" providerId="LiveId" clId="{E63637B8-3230-49FC-8A10-2F32309B36E9}" dt="2025-01-29T00:32:09.282" v="474" actId="20577"/>
+          <ac:graphicFrameMkLst>
+            <pc:docMk/>
+            <pc:sldMk cId="620445983" sldId="257"/>
+            <ac:graphicFrameMk id="5" creationId="{4418C3ED-3996-54DF-BE80-F5D19909478F}"/>
+          </ac:graphicFrameMkLst>
+        </pc:graphicFrameChg>
+      </pc:sldChg>
+      <pc:sldChg chg="modSp">
+        <pc:chgData name="Kimta Nguyen" userId="593776cdb65095db" providerId="LiveId" clId="{E63637B8-3230-49FC-8A10-2F32309B36E9}" dt="2025-01-29T00:43:52.070" v="1197" actId="20577"/>
+        <pc:sldMkLst>
+          <pc:docMk/>
+          <pc:sldMk cId="2622144973" sldId="258"/>
+        </pc:sldMkLst>
+        <pc:graphicFrameChg chg="mod">
+          <ac:chgData name="Kimta Nguyen" userId="593776cdb65095db" providerId="LiveId" clId="{E63637B8-3230-49FC-8A10-2F32309B36E9}" dt="2025-01-29T00:43:52.070" v="1197" actId="20577"/>
+          <ac:graphicFrameMkLst>
+            <pc:docMk/>
+            <pc:sldMk cId="2622144973" sldId="258"/>
+            <ac:graphicFrameMk id="5" creationId="{EE132E0A-1547-9065-3AC8-4587986AC520}"/>
+          </ac:graphicFrameMkLst>
+        </pc:graphicFrameChg>
+      </pc:sldChg>
+      <pc:sldChg chg="modSp">
+        <pc:chgData name="Kimta Nguyen" userId="593776cdb65095db" providerId="LiveId" clId="{E63637B8-3230-49FC-8A10-2F32309B36E9}" dt="2025-01-29T00:44:29.519" v="1250" actId="20577"/>
+        <pc:sldMkLst>
+          <pc:docMk/>
+          <pc:sldMk cId="811848933" sldId="259"/>
+        </pc:sldMkLst>
+        <pc:graphicFrameChg chg="mod">
+          <ac:chgData name="Kimta Nguyen" userId="593776cdb65095db" providerId="LiveId" clId="{E63637B8-3230-49FC-8A10-2F32309B36E9}" dt="2025-01-29T00:44:29.519" v="1250" actId="20577"/>
+          <ac:graphicFrameMkLst>
+            <pc:docMk/>
+            <pc:sldMk cId="811848933" sldId="259"/>
+            <ac:graphicFrameMk id="5" creationId="{4F4FC600-CC48-256B-4CD5-E2FDED92D976}"/>
+          </ac:graphicFrameMkLst>
+        </pc:graphicFrameChg>
+      </pc:sldChg>
+      <pc:sldChg chg="modSp">
+        <pc:chgData name="Kimta Nguyen" userId="593776cdb65095db" providerId="LiveId" clId="{E63637B8-3230-49FC-8A10-2F32309B36E9}" dt="2025-01-29T00:44:48.344" v="1258" actId="20577"/>
         <pc:sldMkLst>
           <pc:docMk/>
           <pc:sldMk cId="3876966267" sldId="260"/>
         </pc:sldMkLst>
         <pc:graphicFrameChg chg="mod">
-          <ac:chgData name="Kimta Nguyen" userId="593776cdb65095db" providerId="LiveId" clId="{E63637B8-3230-49FC-8A10-2F32309B36E9}" dt="2025-01-28T03:32:17.983" v="435"/>
+          <ac:chgData name="Kimta Nguyen" userId="593776cdb65095db" providerId="LiveId" clId="{E63637B8-3230-49FC-8A10-2F32309B36E9}" dt="2025-01-29T00:44:48.344" v="1258" actId="20577"/>
           <ac:graphicFrameMkLst>
             <pc:docMk/>
             <pc:sldMk cId="3876966267" sldId="260"/>
@@ -6423,7 +6468,7 @@
         <a:p>
           <a:r>
             <a:rPr lang="en-US" dirty="0"/>
-            <a:t>Enter in your dishes once and it will stored here for you to go back and reference whenever you want. </a:t>
+            <a:t>Enter in your dishes once and it will be stored on the application for you to go back and reference whenever you want. </a:t>
           </a:r>
         </a:p>
       </dgm:t>
@@ -6600,8 +6645,8 @@
             </a:lnSpc>
           </a:pPr>
           <a:r>
-            <a:rPr lang="en-US"/>
-            <a:t>Do you like to cook? Are you disorganized? Do you have bad memory? Or maybe you’re just too busy? Is finding something to eat difficult? Do you want to make it simpler to remember how to cook your favorite foods? </a:t>
+            <a:rPr lang="en-US" dirty="0"/>
+            <a:t>Do you like to cook? Are you disorganized? Do you have bad memory? Do you find it difficult to figure out what to cook everyday? Or maybe you’re just too busy? Do you want to make it simpler to remember how to cook your favorite foods? </a:t>
           </a:r>
         </a:p>
       </dgm:t>
@@ -6682,7 +6727,7 @@
             </a:lnSpc>
           </a:pPr>
           <a:r>
-            <a:rPr lang="en-US"/>
+            <a:rPr lang="en-US" dirty="0"/>
             <a:t>We want to help people make a small, but significant part of their life simpler by helping them keep your favorite dishes in one spot. </a:t>
           </a:r>
         </a:p>
@@ -6710,6 +6755,47 @@
         </a:p>
       </dgm:t>
     </dgm:pt>
+    <dgm:pt modelId="{F2E714DF-2077-428A-BCD7-A54C11001CC1}">
+      <dgm:prSet/>
+      <dgm:spPr/>
+      <dgm:t>
+        <a:bodyPr/>
+        <a:lstStyle/>
+        <a:p>
+          <a:pPr>
+            <a:lnSpc>
+              <a:spcPct val="100000"/>
+            </a:lnSpc>
+          </a:pPr>
+          <a:r>
+            <a:rPr lang="en-US" dirty="0"/>
+            <a:t>User Story: As a busy person who likes to cook my own meal and not have to search for a new recipes everyday, I want a simple application that houses all my favorite dishes.   </a:t>
+          </a:r>
+        </a:p>
+      </dgm:t>
+    </dgm:pt>
+    <dgm:pt modelId="{765E83FA-B346-44C2-9F55-7F4726D866FF}" type="parTrans" cxnId="{12204929-9A49-4722-8145-0B75449C665C}">
+      <dgm:prSet/>
+      <dgm:spPr/>
+      <dgm:t>
+        <a:bodyPr/>
+        <a:lstStyle/>
+        <a:p>
+          <a:endParaRPr lang="en-US"/>
+        </a:p>
+      </dgm:t>
+    </dgm:pt>
+    <dgm:pt modelId="{68E8B7D4-CA81-4D0A-ABBB-759DB426CE02}" type="sibTrans" cxnId="{12204929-9A49-4722-8145-0B75449C665C}">
+      <dgm:prSet/>
+      <dgm:spPr/>
+      <dgm:t>
+        <a:bodyPr/>
+        <a:lstStyle/>
+        <a:p>
+          <a:endParaRPr lang="en-US"/>
+        </a:p>
+      </dgm:t>
+    </dgm:pt>
     <dgm:pt modelId="{0872D773-3DF6-403E-9888-74770CDE3628}" type="pres">
       <dgm:prSet presAssocID="{DE27A9D9-E7D5-40E7-83CB-5DEAE5E30D8E}" presName="root" presStyleCnt="0">
         <dgm:presLayoutVars>
@@ -6724,11 +6810,11 @@
       <dgm:spPr/>
     </dgm:pt>
     <dgm:pt modelId="{5BDE60D9-071D-4DA8-84A8-E259D82A7177}" type="pres">
-      <dgm:prSet presAssocID="{3542BCA9-5ABC-4F4E-98BA-FC1FDCE18867}" presName="bgRect" presStyleLbl="bgShp" presStyleIdx="0" presStyleCnt="3"/>
+      <dgm:prSet presAssocID="{3542BCA9-5ABC-4F4E-98BA-FC1FDCE18867}" presName="bgRect" presStyleLbl="bgShp" presStyleIdx="0" presStyleCnt="4"/>
       <dgm:spPr/>
     </dgm:pt>
     <dgm:pt modelId="{D8C70A7B-F8CD-4D54-BC69-5ED353C0258B}" type="pres">
-      <dgm:prSet presAssocID="{3542BCA9-5ABC-4F4E-98BA-FC1FDCE18867}" presName="iconRect" presStyleLbl="node1" presStyleIdx="0" presStyleCnt="3"/>
+      <dgm:prSet presAssocID="{3542BCA9-5ABC-4F4E-98BA-FC1FDCE18867}" presName="iconRect" presStyleLbl="node1" presStyleIdx="0" presStyleCnt="4"/>
       <dgm:spPr>
         <a:blipFill>
           <a:blip xmlns:r="http://schemas.openxmlformats.org/officeDocument/2006/relationships" r:embed="rId1">
@@ -6757,7 +6843,7 @@
       <dgm:spPr/>
     </dgm:pt>
     <dgm:pt modelId="{6803FF66-B9EA-4B84-B228-A81F9C1CFD6F}" type="pres">
-      <dgm:prSet presAssocID="{3542BCA9-5ABC-4F4E-98BA-FC1FDCE18867}" presName="parTx" presStyleLbl="revTx" presStyleIdx="0" presStyleCnt="3">
+      <dgm:prSet presAssocID="{3542BCA9-5ABC-4F4E-98BA-FC1FDCE18867}" presName="parTx" presStyleLbl="revTx" presStyleIdx="0" presStyleCnt="4">
         <dgm:presLayoutVars>
           <dgm:chMax val="0"/>
           <dgm:chPref val="0"/>
@@ -6774,11 +6860,11 @@
       <dgm:spPr/>
     </dgm:pt>
     <dgm:pt modelId="{3CD9F619-6B25-4225-8159-A19975402B47}" type="pres">
-      <dgm:prSet presAssocID="{A20B1514-B255-44EE-ADA4-9890C30FCA53}" presName="bgRect" presStyleLbl="bgShp" presStyleIdx="1" presStyleCnt="3"/>
+      <dgm:prSet presAssocID="{A20B1514-B255-44EE-ADA4-9890C30FCA53}" presName="bgRect" presStyleLbl="bgShp" presStyleIdx="1" presStyleCnt="4"/>
       <dgm:spPr/>
     </dgm:pt>
     <dgm:pt modelId="{9533B056-DAFD-4FAA-A993-D7042FFD4B8D}" type="pres">
-      <dgm:prSet presAssocID="{A20B1514-B255-44EE-ADA4-9890C30FCA53}" presName="iconRect" presStyleLbl="node1" presStyleIdx="1" presStyleCnt="3"/>
+      <dgm:prSet presAssocID="{A20B1514-B255-44EE-ADA4-9890C30FCA53}" presName="iconRect" presStyleLbl="node1" presStyleIdx="1" presStyleCnt="4"/>
       <dgm:spPr>
         <a:blipFill>
           <a:blip xmlns:r="http://schemas.openxmlformats.org/officeDocument/2006/relationships" r:embed="rId3">
@@ -6807,7 +6893,7 @@
       <dgm:spPr/>
     </dgm:pt>
     <dgm:pt modelId="{8802ABE3-627C-4D8E-8233-5844589CC32D}" type="pres">
-      <dgm:prSet presAssocID="{A20B1514-B255-44EE-ADA4-9890C30FCA53}" presName="parTx" presStyleLbl="revTx" presStyleIdx="1" presStyleCnt="3">
+      <dgm:prSet presAssocID="{A20B1514-B255-44EE-ADA4-9890C30FCA53}" presName="parTx" presStyleLbl="revTx" presStyleIdx="1" presStyleCnt="4">
         <dgm:presLayoutVars>
           <dgm:chMax val="0"/>
           <dgm:chPref val="0"/>
@@ -6824,11 +6910,11 @@
       <dgm:spPr/>
     </dgm:pt>
     <dgm:pt modelId="{7DAA3A59-B863-4076-B03C-3BBC2924A85D}" type="pres">
-      <dgm:prSet presAssocID="{F0ED6485-8503-4A0C-8BA1-2091A812C1B6}" presName="bgRect" presStyleLbl="bgShp" presStyleIdx="2" presStyleCnt="3"/>
+      <dgm:prSet presAssocID="{F0ED6485-8503-4A0C-8BA1-2091A812C1B6}" presName="bgRect" presStyleLbl="bgShp" presStyleIdx="2" presStyleCnt="4"/>
       <dgm:spPr/>
     </dgm:pt>
     <dgm:pt modelId="{7E2A1472-5586-4C0E-9691-A11F0F529A19}" type="pres">
-      <dgm:prSet presAssocID="{F0ED6485-8503-4A0C-8BA1-2091A812C1B6}" presName="iconRect" presStyleLbl="node1" presStyleIdx="2" presStyleCnt="3"/>
+      <dgm:prSet presAssocID="{F0ED6485-8503-4A0C-8BA1-2091A812C1B6}" presName="iconRect" presStyleLbl="node1" presStyleIdx="2" presStyleCnt="4"/>
       <dgm:spPr>
         <a:blipFill>
           <a:blip xmlns:r="http://schemas.openxmlformats.org/officeDocument/2006/relationships" r:embed="rId5">
@@ -6857,7 +6943,55 @@
       <dgm:spPr/>
     </dgm:pt>
     <dgm:pt modelId="{4726797E-9D14-40A8-BBA5-556FBB890459}" type="pres">
-      <dgm:prSet presAssocID="{F0ED6485-8503-4A0C-8BA1-2091A812C1B6}" presName="parTx" presStyleLbl="revTx" presStyleIdx="2" presStyleCnt="3">
+      <dgm:prSet presAssocID="{F0ED6485-8503-4A0C-8BA1-2091A812C1B6}" presName="parTx" presStyleLbl="revTx" presStyleIdx="2" presStyleCnt="4">
+        <dgm:presLayoutVars>
+          <dgm:chMax val="0"/>
+          <dgm:chPref val="0"/>
+        </dgm:presLayoutVars>
+      </dgm:prSet>
+      <dgm:spPr/>
+    </dgm:pt>
+    <dgm:pt modelId="{8FC02AFF-7A96-4827-9520-7030E2D71C83}" type="pres">
+      <dgm:prSet presAssocID="{D1C5F71E-AE95-48CE-A759-B89F189C0277}" presName="sibTrans" presStyleCnt="0"/>
+      <dgm:spPr/>
+    </dgm:pt>
+    <dgm:pt modelId="{7CB145DB-8B66-4C8B-AC4D-3339644E14AD}" type="pres">
+      <dgm:prSet presAssocID="{F2E714DF-2077-428A-BCD7-A54C11001CC1}" presName="compNode" presStyleCnt="0"/>
+      <dgm:spPr/>
+    </dgm:pt>
+    <dgm:pt modelId="{A5E26458-587B-42B8-9B63-09F08FD1F93E}" type="pres">
+      <dgm:prSet presAssocID="{F2E714DF-2077-428A-BCD7-A54C11001CC1}" presName="bgRect" presStyleLbl="bgShp" presStyleIdx="3" presStyleCnt="4"/>
+      <dgm:spPr/>
+    </dgm:pt>
+    <dgm:pt modelId="{FDBEDEDB-2AB5-4811-B186-849F5F283487}" type="pres">
+      <dgm:prSet presAssocID="{F2E714DF-2077-428A-BCD7-A54C11001CC1}" presName="iconRect" presStyleLbl="node1" presStyleIdx="3" presStyleCnt="4"/>
+      <dgm:spPr>
+        <a:blipFill>
+          <a:blip xmlns:r="http://schemas.openxmlformats.org/officeDocument/2006/relationships" r:embed="rId7">
+            <a:extLst>
+              <a:ext uri="{96DAC541-7B7A-43D3-8B79-37D633B846F1}">
+                <asvg:svgBlip xmlns:asvg="http://schemas.microsoft.com/office/drawing/2016/SVG/main" r:embed="rId8"/>
+              </a:ext>
+            </a:extLst>
+          </a:blip>
+          <a:srcRect/>
+          <a:stretch>
+            <a:fillRect/>
+          </a:stretch>
+        </a:blipFill>
+      </dgm:spPr>
+      <dgm:extLst>
+        <a:ext uri="{E40237B7-FDA0-4F09-8148-C483321AD2D9}">
+          <dgm14:cNvPr xmlns:dgm14="http://schemas.microsoft.com/office/drawing/2010/diagram" id="0" name="" descr="Users with solid fill"/>
+        </a:ext>
+      </dgm:extLst>
+    </dgm:pt>
+    <dgm:pt modelId="{762D6ECC-15C5-45C4-982C-1A0D3E6AEB1A}" type="pres">
+      <dgm:prSet presAssocID="{F2E714DF-2077-428A-BCD7-A54C11001CC1}" presName="spaceRect" presStyleCnt="0"/>
+      <dgm:spPr/>
+    </dgm:pt>
+    <dgm:pt modelId="{71CD7F53-DD92-4F08-8955-0C77D21C45F2}" type="pres">
+      <dgm:prSet presAssocID="{F2E714DF-2077-428A-BCD7-A54C11001CC1}" presName="parTx" presStyleLbl="revTx" presStyleIdx="3" presStyleCnt="4">
         <dgm:presLayoutVars>
           <dgm:chMax val="0"/>
           <dgm:chPref val="0"/>
@@ -6867,8 +7001,10 @@
     </dgm:pt>
   </dgm:ptLst>
   <dgm:cxnLst>
+    <dgm:cxn modelId="{12204929-9A49-4722-8145-0B75449C665C}" srcId="{DE27A9D9-E7D5-40E7-83CB-5DEAE5E30D8E}" destId="{F2E714DF-2077-428A-BCD7-A54C11001CC1}" srcOrd="3" destOrd="0" parTransId="{765E83FA-B346-44C2-9F55-7F4726D866FF}" sibTransId="{68E8B7D4-CA81-4D0A-ABBB-759DB426CE02}"/>
     <dgm:cxn modelId="{76F0D62E-B9BB-46FA-A1FE-C5A0BD604395}" srcId="{DE27A9D9-E7D5-40E7-83CB-5DEAE5E30D8E}" destId="{A20B1514-B255-44EE-ADA4-9890C30FCA53}" srcOrd="1" destOrd="0" parTransId="{C118B15F-5102-4C29-AA0D-AA59398F8978}" sibTransId="{2F50BEAE-9977-4D39-B4BB-5FDBA9092B13}"/>
     <dgm:cxn modelId="{2EAF7E69-56BF-4001-9A4E-EF59E371B7D0}" type="presOf" srcId="{DE27A9D9-E7D5-40E7-83CB-5DEAE5E30D8E}" destId="{0872D773-3DF6-403E-9888-74770CDE3628}" srcOrd="0" destOrd="0" presId="urn:microsoft.com/office/officeart/2018/2/layout/IconVerticalSolidList"/>
+    <dgm:cxn modelId="{B86D0B70-7384-43F9-BB53-B33191E04944}" type="presOf" srcId="{F2E714DF-2077-428A-BCD7-A54C11001CC1}" destId="{71CD7F53-DD92-4F08-8955-0C77D21C45F2}" srcOrd="0" destOrd="0" presId="urn:microsoft.com/office/officeart/2018/2/layout/IconVerticalSolidList"/>
     <dgm:cxn modelId="{99EB0291-5EC9-4FD4-A817-1B53656066C7}" type="presOf" srcId="{A20B1514-B255-44EE-ADA4-9890C30FCA53}" destId="{8802ABE3-627C-4D8E-8233-5844589CC32D}" srcOrd="0" destOrd="0" presId="urn:microsoft.com/office/officeart/2018/2/layout/IconVerticalSolidList"/>
     <dgm:cxn modelId="{C780AD95-18F2-4793-97C7-7E473C1DB239}" type="presOf" srcId="{3542BCA9-5ABC-4F4E-98BA-FC1FDCE18867}" destId="{6803FF66-B9EA-4B84-B228-A81F9C1CFD6F}" srcOrd="0" destOrd="0" presId="urn:microsoft.com/office/officeart/2018/2/layout/IconVerticalSolidList"/>
     <dgm:cxn modelId="{17DF21A4-69BF-49AB-B459-FB502FDD2A7D}" srcId="{DE27A9D9-E7D5-40E7-83CB-5DEAE5E30D8E}" destId="{F0ED6485-8503-4A0C-8BA1-2091A812C1B6}" srcOrd="2" destOrd="0" parTransId="{DBF71207-09E7-4AA3-82C2-42FA2097471C}" sibTransId="{D1C5F71E-AE95-48CE-A759-B89F189C0277}"/>
@@ -6891,6 +7027,12 @@
     <dgm:cxn modelId="{AD64227A-FBB2-4719-ABAA-D3C283D9510D}" type="presParOf" srcId="{59B38577-DA02-4E16-BDCD-D093B1FA0E0B}" destId="{7E2A1472-5586-4C0E-9691-A11F0F529A19}" srcOrd="1" destOrd="0" presId="urn:microsoft.com/office/officeart/2018/2/layout/IconVerticalSolidList"/>
     <dgm:cxn modelId="{2F5675B3-D29B-4C73-9127-1CCEF048B81D}" type="presParOf" srcId="{59B38577-DA02-4E16-BDCD-D093B1FA0E0B}" destId="{5D4ADF7F-0B0A-44FF-BD9F-76713850D2EF}" srcOrd="2" destOrd="0" presId="urn:microsoft.com/office/officeart/2018/2/layout/IconVerticalSolidList"/>
     <dgm:cxn modelId="{E5C2A291-C12C-44C5-8237-46C015ADE652}" type="presParOf" srcId="{59B38577-DA02-4E16-BDCD-D093B1FA0E0B}" destId="{4726797E-9D14-40A8-BBA5-556FBB890459}" srcOrd="3" destOrd="0" presId="urn:microsoft.com/office/officeart/2018/2/layout/IconVerticalSolidList"/>
+    <dgm:cxn modelId="{B8F2B820-3FDD-4CFB-B2BF-0DA648348C69}" type="presParOf" srcId="{0872D773-3DF6-403E-9888-74770CDE3628}" destId="{8FC02AFF-7A96-4827-9520-7030E2D71C83}" srcOrd="5" destOrd="0" presId="urn:microsoft.com/office/officeart/2018/2/layout/IconVerticalSolidList"/>
+    <dgm:cxn modelId="{4F6F2EFE-6D64-41A2-8A5B-CA45B69D48D1}" type="presParOf" srcId="{0872D773-3DF6-403E-9888-74770CDE3628}" destId="{7CB145DB-8B66-4C8B-AC4D-3339644E14AD}" srcOrd="6" destOrd="0" presId="urn:microsoft.com/office/officeart/2018/2/layout/IconVerticalSolidList"/>
+    <dgm:cxn modelId="{E886B954-C3BC-46BD-84C3-59FBBBFD0072}" type="presParOf" srcId="{7CB145DB-8B66-4C8B-AC4D-3339644E14AD}" destId="{A5E26458-587B-42B8-9B63-09F08FD1F93E}" srcOrd="0" destOrd="0" presId="urn:microsoft.com/office/officeart/2018/2/layout/IconVerticalSolidList"/>
+    <dgm:cxn modelId="{A70EDAC1-E650-41E6-B66A-316A392573D2}" type="presParOf" srcId="{7CB145DB-8B66-4C8B-AC4D-3339644E14AD}" destId="{FDBEDEDB-2AB5-4811-B186-849F5F283487}" srcOrd="1" destOrd="0" presId="urn:microsoft.com/office/officeart/2018/2/layout/IconVerticalSolidList"/>
+    <dgm:cxn modelId="{F3643261-09EA-492A-9E47-5266D833311B}" type="presParOf" srcId="{7CB145DB-8B66-4C8B-AC4D-3339644E14AD}" destId="{762D6ECC-15C5-45C4-982C-1A0D3E6AEB1A}" srcOrd="2" destOrd="0" presId="urn:microsoft.com/office/officeart/2018/2/layout/IconVerticalSolidList"/>
+    <dgm:cxn modelId="{22A55C44-62CB-4772-A7DE-FFD03110BB47}" type="presParOf" srcId="{7CB145DB-8B66-4C8B-AC4D-3339644E14AD}" destId="{71CD7F53-DD92-4F08-8955-0C77D21C45F2}" srcOrd="3" destOrd="0" presId="urn:microsoft.com/office/officeart/2018/2/layout/IconVerticalSolidList"/>
   </dgm:cxnLst>
   <dgm:bg/>
   <dgm:whole/>
@@ -7024,7 +7166,7 @@
           </a:r>
           <a:r>
             <a:rPr lang="en-US" sz="1600" dirty="0"/>
-            <a:t>: Pure CSS</a:t>
+            <a:t>: Pure CSS to build the form and structure the site</a:t>
           </a:r>
         </a:p>
       </dgm:t>
@@ -7299,13 +7441,8 @@
           </a:pPr>
           <a:r>
             <a:rPr lang="en-US" dirty="0"/>
-            <a:t>Taking the idea and turning it </a:t>
+            <a:t>Taking the idea and turning it into code</a:t>
           </a:r>
-          <a:r>
-            <a:rPr lang="en-US" dirty="0" err="1"/>
-            <a:t>i</a:t>
-          </a:r>
-          <a:endParaRPr lang="en-US" dirty="0"/>
         </a:p>
       </dgm:t>
     </dgm:pt>
@@ -8859,7 +8996,7 @@
           </a:pPr>
           <a:r>
             <a:rPr lang="en-US" sz="2200" kern="1200" dirty="0"/>
-            <a:t>Enter in your dishes once and it will stored here for you to go back and reference whenever you want. </a:t>
+            <a:t>Enter in your dishes once and it will be stored on the application for you to go back and reference whenever you want. </a:t>
           </a:r>
         </a:p>
       </dsp:txBody>
@@ -8979,8 +9116,8 @@
       </dsp:nvSpPr>
       <dsp:spPr>
         <a:xfrm>
-          <a:off x="0" y="499"/>
-          <a:ext cx="9618133" cy="1169280"/>
+          <a:off x="0" y="1698"/>
+          <a:ext cx="9618133" cy="861070"/>
         </a:xfrm>
         <a:prstGeom prst="roundRect">
           <a:avLst>
@@ -9021,8 +9158,8 @@
       </dsp:nvSpPr>
       <dsp:spPr>
         <a:xfrm>
-          <a:off x="353707" y="263587"/>
-          <a:ext cx="643104" cy="643104"/>
+          <a:off x="260473" y="195439"/>
+          <a:ext cx="473588" cy="473588"/>
         </a:xfrm>
         <a:prstGeom prst="rect">
           <a:avLst/>
@@ -9077,8 +9214,8 @@
       </dsp:nvSpPr>
       <dsp:spPr>
         <a:xfrm>
-          <a:off x="1350519" y="499"/>
-          <a:ext cx="8267613" cy="1169280"/>
+          <a:off x="994536" y="1698"/>
+          <a:ext cx="8623596" cy="861070"/>
         </a:xfrm>
         <a:prstGeom prst="rect">
           <a:avLst/>
@@ -9102,12 +9239,12 @@
         <a:fontRef idx="minor"/>
       </dsp:style>
       <dsp:txBody>
-        <a:bodyPr spcFirstLastPara="0" vert="horz" wrap="square" lIns="123749" tIns="123749" rIns="123749" bIns="123749" numCol="1" spcCol="1270" anchor="ctr" anchorCtr="0">
+        <a:bodyPr spcFirstLastPara="0" vert="horz" wrap="square" lIns="91130" tIns="91130" rIns="91130" bIns="91130" numCol="1" spcCol="1270" anchor="ctr" anchorCtr="0">
           <a:noAutofit/>
         </a:bodyPr>
         <a:lstStyle/>
         <a:p>
-          <a:pPr marL="0" lvl="0" indent="0" algn="l" defTabSz="844550">
+          <a:pPr marL="0" lvl="0" indent="0" algn="l" defTabSz="666750">
             <a:lnSpc>
               <a:spcPct val="100000"/>
             </a:lnSpc>
@@ -9120,14 +9257,14 @@
             <a:buNone/>
           </a:pPr>
           <a:r>
-            <a:rPr lang="en-US" sz="1900" kern="1200"/>
-            <a:t>Do you like to cook? Are you disorganized? Do you have bad memory? Or maybe you’re just too busy? Is finding something to eat difficult? Do you want to make it simpler to remember how to cook your favorite foods? </a:t>
+            <a:rPr lang="en-US" sz="1500" kern="1200" dirty="0"/>
+            <a:t>Do you like to cook? Are you disorganized? Do you have bad memory? Do you find it difficult to figure out what to cook everyday? Or maybe you’re just too busy? Do you want to make it simpler to remember how to cook your favorite foods? </a:t>
           </a:r>
         </a:p>
       </dsp:txBody>
       <dsp:txXfrm>
-        <a:off x="1350519" y="499"/>
-        <a:ext cx="8267613" cy="1169280"/>
+        <a:off x="994536" y="1698"/>
+        <a:ext cx="8623596" cy="861070"/>
       </dsp:txXfrm>
     </dsp:sp>
     <dsp:sp modelId="{3CD9F619-6B25-4225-8159-A19975402B47}">
@@ -9137,8 +9274,8 @@
       </dsp:nvSpPr>
       <dsp:spPr>
         <a:xfrm>
-          <a:off x="0" y="1462100"/>
-          <a:ext cx="9618133" cy="1169280"/>
+          <a:off x="0" y="1078036"/>
+          <a:ext cx="9618133" cy="861070"/>
         </a:xfrm>
         <a:prstGeom prst="roundRect">
           <a:avLst>
@@ -9179,8 +9316,8 @@
       </dsp:nvSpPr>
       <dsp:spPr>
         <a:xfrm>
-          <a:off x="353707" y="1725188"/>
-          <a:ext cx="643104" cy="643104"/>
+          <a:off x="260473" y="1271777"/>
+          <a:ext cx="473588" cy="473588"/>
         </a:xfrm>
         <a:prstGeom prst="rect">
           <a:avLst/>
@@ -9235,8 +9372,8 @@
       </dsp:nvSpPr>
       <dsp:spPr>
         <a:xfrm>
-          <a:off x="1350519" y="1462100"/>
-          <a:ext cx="8267613" cy="1169280"/>
+          <a:off x="994536" y="1078036"/>
+          <a:ext cx="8623596" cy="861070"/>
         </a:xfrm>
         <a:prstGeom prst="rect">
           <a:avLst/>
@@ -9260,12 +9397,12 @@
         <a:fontRef idx="minor"/>
       </dsp:style>
       <dsp:txBody>
-        <a:bodyPr spcFirstLastPara="0" vert="horz" wrap="square" lIns="123749" tIns="123749" rIns="123749" bIns="123749" numCol="1" spcCol="1270" anchor="ctr" anchorCtr="0">
+        <a:bodyPr spcFirstLastPara="0" vert="horz" wrap="square" lIns="91130" tIns="91130" rIns="91130" bIns="91130" numCol="1" spcCol="1270" anchor="ctr" anchorCtr="0">
           <a:noAutofit/>
         </a:bodyPr>
         <a:lstStyle/>
         <a:p>
-          <a:pPr marL="0" lvl="0" indent="0" algn="l" defTabSz="844550">
+          <a:pPr marL="0" lvl="0" indent="0" algn="l" defTabSz="666750">
             <a:lnSpc>
               <a:spcPct val="100000"/>
             </a:lnSpc>
@@ -9278,14 +9415,14 @@
             <a:buNone/>
           </a:pPr>
           <a:r>
-            <a:rPr lang="en-US" sz="1900" kern="1200"/>
+            <a:rPr lang="en-US" sz="1500" kern="1200"/>
             <a:t>Foodies Delight was born to assist cooking enthusiasts by storing their favorite recipes in a central location, so they don’t have to scour the internet to find something to cook. </a:t>
           </a:r>
         </a:p>
       </dsp:txBody>
       <dsp:txXfrm>
-        <a:off x="1350519" y="1462100"/>
-        <a:ext cx="8267613" cy="1169280"/>
+        <a:off x="994536" y="1078036"/>
+        <a:ext cx="8623596" cy="861070"/>
       </dsp:txXfrm>
     </dsp:sp>
     <dsp:sp modelId="{7DAA3A59-B863-4076-B03C-3BBC2924A85D}">
@@ -9295,8 +9432,8 @@
       </dsp:nvSpPr>
       <dsp:spPr>
         <a:xfrm>
-          <a:off x="0" y="2923701"/>
-          <a:ext cx="9618133" cy="1169280"/>
+          <a:off x="0" y="2154374"/>
+          <a:ext cx="9618133" cy="861070"/>
         </a:xfrm>
         <a:prstGeom prst="roundRect">
           <a:avLst>
@@ -9337,8 +9474,8 @@
       </dsp:nvSpPr>
       <dsp:spPr>
         <a:xfrm>
-          <a:off x="353707" y="3186789"/>
-          <a:ext cx="643104" cy="643104"/>
+          <a:off x="260473" y="2348115"/>
+          <a:ext cx="473588" cy="473588"/>
         </a:xfrm>
         <a:prstGeom prst="rect">
           <a:avLst/>
@@ -9393,8 +9530,8 @@
       </dsp:nvSpPr>
       <dsp:spPr>
         <a:xfrm>
-          <a:off x="1350519" y="2923701"/>
-          <a:ext cx="8267613" cy="1169280"/>
+          <a:off x="994536" y="2154374"/>
+          <a:ext cx="8623596" cy="861070"/>
         </a:xfrm>
         <a:prstGeom prst="rect">
           <a:avLst/>
@@ -9418,12 +9555,12 @@
         <a:fontRef idx="minor"/>
       </dsp:style>
       <dsp:txBody>
-        <a:bodyPr spcFirstLastPara="0" vert="horz" wrap="square" lIns="123749" tIns="123749" rIns="123749" bIns="123749" numCol="1" spcCol="1270" anchor="ctr" anchorCtr="0">
+        <a:bodyPr spcFirstLastPara="0" vert="horz" wrap="square" lIns="91130" tIns="91130" rIns="91130" bIns="91130" numCol="1" spcCol="1270" anchor="ctr" anchorCtr="0">
           <a:noAutofit/>
         </a:bodyPr>
         <a:lstStyle/>
         <a:p>
-          <a:pPr marL="0" lvl="0" indent="0" algn="l" defTabSz="844550">
+          <a:pPr marL="0" lvl="0" indent="0" algn="l" defTabSz="666750">
             <a:lnSpc>
               <a:spcPct val="100000"/>
             </a:lnSpc>
@@ -9436,14 +9573,170 @@
             <a:buNone/>
           </a:pPr>
           <a:r>
-            <a:rPr lang="en-US" sz="1900" kern="1200"/>
+            <a:rPr lang="en-US" sz="1500" kern="1200" dirty="0"/>
             <a:t>We want to help people make a small, but significant part of their life simpler by helping them keep your favorite dishes in one spot. </a:t>
           </a:r>
         </a:p>
       </dsp:txBody>
       <dsp:txXfrm>
-        <a:off x="1350519" y="2923701"/>
-        <a:ext cx="8267613" cy="1169280"/>
+        <a:off x="994536" y="2154374"/>
+        <a:ext cx="8623596" cy="861070"/>
+      </dsp:txXfrm>
+    </dsp:sp>
+    <dsp:sp modelId="{A5E26458-587B-42B8-9B63-09F08FD1F93E}">
+      <dsp:nvSpPr>
+        <dsp:cNvPr id="0" name=""/>
+        <dsp:cNvSpPr/>
+      </dsp:nvSpPr>
+      <dsp:spPr>
+        <a:xfrm>
+          <a:off x="0" y="3230712"/>
+          <a:ext cx="9618133" cy="861070"/>
+        </a:xfrm>
+        <a:prstGeom prst="roundRect">
+          <a:avLst>
+            <a:gd name="adj" fmla="val 10000"/>
+          </a:avLst>
+        </a:prstGeom>
+        <a:solidFill>
+          <a:schemeClr val="accent2">
+            <a:tint val="40000"/>
+            <a:hueOff val="0"/>
+            <a:satOff val="0"/>
+            <a:lumOff val="0"/>
+            <a:alphaOff val="0"/>
+          </a:schemeClr>
+        </a:solidFill>
+        <a:ln>
+          <a:noFill/>
+        </a:ln>
+        <a:effectLst/>
+      </dsp:spPr>
+      <dsp:style>
+        <a:lnRef idx="0">
+          <a:scrgbClr r="0" g="0" b="0"/>
+        </a:lnRef>
+        <a:fillRef idx="1">
+          <a:scrgbClr r="0" g="0" b="0"/>
+        </a:fillRef>
+        <a:effectRef idx="0">
+          <a:scrgbClr r="0" g="0" b="0"/>
+        </a:effectRef>
+        <a:fontRef idx="minor"/>
+      </dsp:style>
+    </dsp:sp>
+    <dsp:sp modelId="{FDBEDEDB-2AB5-4811-B186-849F5F283487}">
+      <dsp:nvSpPr>
+        <dsp:cNvPr id="0" name=""/>
+        <dsp:cNvSpPr/>
+      </dsp:nvSpPr>
+      <dsp:spPr>
+        <a:xfrm>
+          <a:off x="260473" y="3424453"/>
+          <a:ext cx="473588" cy="473588"/>
+        </a:xfrm>
+        <a:prstGeom prst="rect">
+          <a:avLst/>
+        </a:prstGeom>
+        <a:blipFill>
+          <a:blip xmlns:r="http://schemas.openxmlformats.org/officeDocument/2006/relationships" r:embed="rId7">
+            <a:extLst>
+              <a:ext uri="{96DAC541-7B7A-43D3-8B79-37D633B846F1}">
+                <asvg:svgBlip xmlns:asvg="http://schemas.microsoft.com/office/drawing/2016/SVG/main" r:embed="rId8"/>
+              </a:ext>
+            </a:extLst>
+          </a:blip>
+          <a:srcRect/>
+          <a:stretch>
+            <a:fillRect/>
+          </a:stretch>
+        </a:blipFill>
+        <a:ln w="19050" cap="rnd" cmpd="sng" algn="ctr">
+          <a:solidFill>
+            <a:schemeClr val="lt1">
+              <a:hueOff val="0"/>
+              <a:satOff val="0"/>
+              <a:lumOff val="0"/>
+              <a:alphaOff val="0"/>
+            </a:schemeClr>
+          </a:solidFill>
+          <a:prstDash val="solid"/>
+        </a:ln>
+        <a:effectLst/>
+      </dsp:spPr>
+      <dsp:style>
+        <a:lnRef idx="2">
+          <a:scrgbClr r="0" g="0" b="0"/>
+        </a:lnRef>
+        <a:fillRef idx="1">
+          <a:scrgbClr r="0" g="0" b="0"/>
+        </a:fillRef>
+        <a:effectRef idx="0">
+          <a:scrgbClr r="0" g="0" b="0"/>
+        </a:effectRef>
+        <a:fontRef idx="minor">
+          <a:schemeClr val="lt1"/>
+        </a:fontRef>
+      </dsp:style>
+    </dsp:sp>
+    <dsp:sp modelId="{71CD7F53-DD92-4F08-8955-0C77D21C45F2}">
+      <dsp:nvSpPr>
+        <dsp:cNvPr id="0" name=""/>
+        <dsp:cNvSpPr/>
+      </dsp:nvSpPr>
+      <dsp:spPr>
+        <a:xfrm>
+          <a:off x="994536" y="3230712"/>
+          <a:ext cx="8623596" cy="861070"/>
+        </a:xfrm>
+        <a:prstGeom prst="rect">
+          <a:avLst/>
+        </a:prstGeom>
+        <a:noFill/>
+        <a:ln>
+          <a:noFill/>
+        </a:ln>
+        <a:effectLst/>
+      </dsp:spPr>
+      <dsp:style>
+        <a:lnRef idx="0">
+          <a:scrgbClr r="0" g="0" b="0"/>
+        </a:lnRef>
+        <a:fillRef idx="0">
+          <a:scrgbClr r="0" g="0" b="0"/>
+        </a:fillRef>
+        <a:effectRef idx="0">
+          <a:scrgbClr r="0" g="0" b="0"/>
+        </a:effectRef>
+        <a:fontRef idx="minor"/>
+      </dsp:style>
+      <dsp:txBody>
+        <a:bodyPr spcFirstLastPara="0" vert="horz" wrap="square" lIns="91130" tIns="91130" rIns="91130" bIns="91130" numCol="1" spcCol="1270" anchor="ctr" anchorCtr="0">
+          <a:noAutofit/>
+        </a:bodyPr>
+        <a:lstStyle/>
+        <a:p>
+          <a:pPr marL="0" lvl="0" indent="0" algn="l" defTabSz="666750">
+            <a:lnSpc>
+              <a:spcPct val="100000"/>
+            </a:lnSpc>
+            <a:spcBef>
+              <a:spcPct val="0"/>
+            </a:spcBef>
+            <a:spcAft>
+              <a:spcPct val="35000"/>
+            </a:spcAft>
+            <a:buNone/>
+          </a:pPr>
+          <a:r>
+            <a:rPr lang="en-US" sz="1500" kern="1200" dirty="0"/>
+            <a:t>User Story: As a busy person who likes to cook my own meal and not have to search for a new recipes everyday, I want a simple application that houses all my favorite dishes.   </a:t>
+          </a:r>
+        </a:p>
+      </dsp:txBody>
+      <dsp:txXfrm>
+        <a:off x="994536" y="3230712"/>
+        <a:ext cx="8623596" cy="861070"/>
       </dsp:txXfrm>
     </dsp:sp>
   </dsp:spTree>
@@ -9809,7 +10102,7 @@
           </a:r>
           <a:r>
             <a:rPr lang="en-US" sz="1600" kern="1200" dirty="0"/>
-            <a:t>: Pure CSS</a:t>
+            <a:t>: Pure CSS to build the form and structure the site</a:t>
           </a:r>
         </a:p>
       </dsp:txBody>
@@ -10119,13 +10412,8 @@
           </a:pPr>
           <a:r>
             <a:rPr lang="en-US" sz="1500" kern="1200" dirty="0"/>
-            <a:t>Taking the idea and turning it </a:t>
+            <a:t>Taking the idea and turning it into code</a:t>
           </a:r>
-          <a:r>
-            <a:rPr lang="en-US" sz="1500" kern="1200" dirty="0" err="1"/>
-            <a:t>i</a:t>
-          </a:r>
-          <a:endParaRPr lang="en-US" sz="1500" kern="1200" dirty="0"/>
         </a:p>
       </dsp:txBody>
       <dsp:txXfrm>
@@ -21083,7 +21371,7 @@
           <a:p>
             <a:fld id="{78CFA5E6-8292-4440-9A7E-4CCDCBD5D40C}" type="datetimeFigureOut">
               <a:rPr lang="en-US" smtClean="0"/>
-              <a:t>1/27/2025</a:t>
+              <a:t>1/28/2025</a:t>
             </a:fld>
             <a:endParaRPr lang="en-US"/>
           </a:p>
@@ -21334,7 +21622,7 @@
           <a:p>
             <a:fld id="{78CFA5E6-8292-4440-9A7E-4CCDCBD5D40C}" type="datetimeFigureOut">
               <a:rPr lang="en-US" smtClean="0"/>
-              <a:t>1/27/2025</a:t>
+              <a:t>1/28/2025</a:t>
             </a:fld>
             <a:endParaRPr lang="en-US"/>
           </a:p>
@@ -21648,7 +21936,7 @@
           <a:p>
             <a:fld id="{78CFA5E6-8292-4440-9A7E-4CCDCBD5D40C}" type="datetimeFigureOut">
               <a:rPr lang="en-US" smtClean="0"/>
-              <a:t>1/27/2025</a:t>
+              <a:t>1/28/2025</a:t>
             </a:fld>
             <a:endParaRPr lang="en-US"/>
           </a:p>
@@ -21989,7 +22277,7 @@
           <a:p>
             <a:fld id="{78CFA5E6-8292-4440-9A7E-4CCDCBD5D40C}" type="datetimeFigureOut">
               <a:rPr lang="en-US" smtClean="0"/>
-              <a:t>1/27/2025</a:t>
+              <a:t>1/28/2025</a:t>
             </a:fld>
             <a:endParaRPr lang="en-US"/>
           </a:p>
@@ -22303,7 +22591,7 @@
           <a:p>
             <a:fld id="{78CFA5E6-8292-4440-9A7E-4CCDCBD5D40C}" type="datetimeFigureOut">
               <a:rPr lang="en-US" smtClean="0"/>
-              <a:t>1/27/2025</a:t>
+              <a:t>1/28/2025</a:t>
             </a:fld>
             <a:endParaRPr lang="en-US"/>
           </a:p>
@@ -22696,7 +22984,7 @@
           <a:p>
             <a:fld id="{78CFA5E6-8292-4440-9A7E-4CCDCBD5D40C}" type="datetimeFigureOut">
               <a:rPr lang="en-US" smtClean="0"/>
-              <a:t>1/27/2025</a:t>
+              <a:t>1/28/2025</a:t>
             </a:fld>
             <a:endParaRPr lang="en-US"/>
           </a:p>
@@ -22866,7 +23154,7 @@
           <a:p>
             <a:fld id="{78CFA5E6-8292-4440-9A7E-4CCDCBD5D40C}" type="datetimeFigureOut">
               <a:rPr lang="en-US" smtClean="0"/>
-              <a:t>1/27/2025</a:t>
+              <a:t>1/28/2025</a:t>
             </a:fld>
             <a:endParaRPr lang="en-US"/>
           </a:p>
@@ -23046,7 +23334,7 @@
           <a:p>
             <a:fld id="{78CFA5E6-8292-4440-9A7E-4CCDCBD5D40C}" type="datetimeFigureOut">
               <a:rPr lang="en-US" smtClean="0"/>
-              <a:t>1/27/2025</a:t>
+              <a:t>1/28/2025</a:t>
             </a:fld>
             <a:endParaRPr lang="en-US"/>
           </a:p>
@@ -23222,7 +23510,7 @@
           <a:p>
             <a:fld id="{78CFA5E6-8292-4440-9A7E-4CCDCBD5D40C}" type="datetimeFigureOut">
               <a:rPr lang="en-US" smtClean="0"/>
-              <a:t>1/27/2025</a:t>
+              <a:t>1/28/2025</a:t>
             </a:fld>
             <a:endParaRPr lang="en-US"/>
           </a:p>
@@ -23469,7 +23757,7 @@
           <a:p>
             <a:fld id="{78CFA5E6-8292-4440-9A7E-4CCDCBD5D40C}" type="datetimeFigureOut">
               <a:rPr lang="en-US" smtClean="0"/>
-              <a:t>1/27/2025</a:t>
+              <a:t>1/28/2025</a:t>
             </a:fld>
             <a:endParaRPr lang="en-US"/>
           </a:p>
@@ -23701,7 +23989,7 @@
           <a:p>
             <a:fld id="{78CFA5E6-8292-4440-9A7E-4CCDCBD5D40C}" type="datetimeFigureOut">
               <a:rPr lang="en-US" smtClean="0"/>
-              <a:t>1/27/2025</a:t>
+              <a:t>1/28/2025</a:t>
             </a:fld>
             <a:endParaRPr lang="en-US"/>
           </a:p>
@@ -24075,7 +24363,7 @@
           <a:p>
             <a:fld id="{78CFA5E6-8292-4440-9A7E-4CCDCBD5D40C}" type="datetimeFigureOut">
               <a:rPr lang="en-US" smtClean="0"/>
-              <a:t>1/27/2025</a:t>
+              <a:t>1/28/2025</a:t>
             </a:fld>
             <a:endParaRPr lang="en-US"/>
           </a:p>
@@ -24198,7 +24486,7 @@
           <a:p>
             <a:fld id="{78CFA5E6-8292-4440-9A7E-4CCDCBD5D40C}" type="datetimeFigureOut">
               <a:rPr lang="en-US" smtClean="0"/>
-              <a:t>1/27/2025</a:t>
+              <a:t>1/28/2025</a:t>
             </a:fld>
             <a:endParaRPr lang="en-US"/>
           </a:p>
@@ -24293,7 +24581,7 @@
           <a:p>
             <a:fld id="{78CFA5E6-8292-4440-9A7E-4CCDCBD5D40C}" type="datetimeFigureOut">
               <a:rPr lang="en-US" smtClean="0"/>
-              <a:t>1/27/2025</a:t>
+              <a:t>1/28/2025</a:t>
             </a:fld>
             <a:endParaRPr lang="en-US"/>
           </a:p>
@@ -24548,7 +24836,7 @@
           <a:p>
             <a:fld id="{78CFA5E6-8292-4440-9A7E-4CCDCBD5D40C}" type="datetimeFigureOut">
               <a:rPr lang="en-US" smtClean="0"/>
-              <a:t>1/27/2025</a:t>
+              <a:t>1/28/2025</a:t>
             </a:fld>
             <a:endParaRPr lang="en-US"/>
           </a:p>
@@ -24811,7 +25099,7 @@
           <a:p>
             <a:fld id="{78CFA5E6-8292-4440-9A7E-4CCDCBD5D40C}" type="datetimeFigureOut">
               <a:rPr lang="en-US" smtClean="0"/>
-              <a:t>1/27/2025</a:t>
+              <a:t>1/28/2025</a:t>
             </a:fld>
             <a:endParaRPr lang="en-US"/>
           </a:p>
@@ -25554,7 +25842,7 @@
           <a:p>
             <a:fld id="{78CFA5E6-8292-4440-9A7E-4CCDCBD5D40C}" type="datetimeFigureOut">
               <a:rPr lang="en-US" smtClean="0"/>
-              <a:t>1/27/2025</a:t>
+              <a:t>1/28/2025</a:t>
             </a:fld>
             <a:endParaRPr lang="en-US"/>
           </a:p>
@@ -27033,7 +27321,7 @@
             <p:ph idx="1"/>
             <p:extLst>
               <p:ext uri="{D42A27DB-BD31-4B8C-83A1-F6EECF244321}">
-                <p14:modId xmlns:p14="http://schemas.microsoft.com/office/powerpoint/2010/main" val="3540086964"/>
+                <p14:modId xmlns:p14="http://schemas.microsoft.com/office/powerpoint/2010/main" val="2090015246"/>
               </p:ext>
             </p:extLst>
           </p:nvPr>
@@ -27327,7 +27615,7 @@
             <p:ph idx="1"/>
             <p:extLst>
               <p:ext uri="{D42A27DB-BD31-4B8C-83A1-F6EECF244321}">
-                <p14:modId xmlns:p14="http://schemas.microsoft.com/office/powerpoint/2010/main" val="3581481237"/>
+                <p14:modId xmlns:p14="http://schemas.microsoft.com/office/powerpoint/2010/main" val="944783169"/>
               </p:ext>
             </p:extLst>
           </p:nvPr>
@@ -27428,7 +27716,7 @@
             <p:ph idx="1"/>
             <p:extLst>
               <p:ext uri="{D42A27DB-BD31-4B8C-83A1-F6EECF244321}">
-                <p14:modId xmlns:p14="http://schemas.microsoft.com/office/powerpoint/2010/main" val="587998465"/>
+                <p14:modId xmlns:p14="http://schemas.microsoft.com/office/powerpoint/2010/main" val="3799987388"/>
               </p:ext>
             </p:extLst>
           </p:nvPr>
@@ -27734,7 +28022,7 @@
             <p:ph idx="1"/>
             <p:extLst>
               <p:ext uri="{D42A27DB-BD31-4B8C-83A1-F6EECF244321}">
-                <p14:modId xmlns:p14="http://schemas.microsoft.com/office/powerpoint/2010/main" val="209639416"/>
+                <p14:modId xmlns:p14="http://schemas.microsoft.com/office/powerpoint/2010/main" val="1242776566"/>
               </p:ext>
             </p:extLst>
           </p:nvPr>

</xml_diff>